<commit_message>
Slightly modify instructions for Exp 4
</commit_message>
<xml_diff>
--- a/Exp4/code/experiment/Instructions.pptx
+++ b/Exp4/code/experiment/Instructions.pptx
@@ -228,7 +228,7 @@
           <a:p>
             <a:fld id="{DE0D2635-BDFF-FC4B-BBDA-1B5475F6174E}" type="datetimeFigureOut">
               <a:rPr lang="en-US" smtClean="0"/>
-              <a:t>12/12/22</a:t>
+              <a:t>1/9/23</a:t>
             </a:fld>
             <a:endParaRPr lang="en-US"/>
           </a:p>
@@ -758,7 +758,7 @@
           <a:p>
             <a:fld id="{7212EF1E-2CB8-C54B-94EB-0C51FB85BFE6}" type="datetimeFigureOut">
               <a:rPr lang="en-US" smtClean="0"/>
-              <a:t>12/12/22</a:t>
+              <a:t>1/9/23</a:t>
             </a:fld>
             <a:endParaRPr lang="en-US"/>
           </a:p>
@@ -926,7 +926,7 @@
           <a:p>
             <a:fld id="{7212EF1E-2CB8-C54B-94EB-0C51FB85BFE6}" type="datetimeFigureOut">
               <a:rPr lang="en-US" smtClean="0"/>
-              <a:t>12/12/22</a:t>
+              <a:t>1/9/23</a:t>
             </a:fld>
             <a:endParaRPr lang="en-US"/>
           </a:p>
@@ -1104,7 +1104,7 @@
           <a:p>
             <a:fld id="{7212EF1E-2CB8-C54B-94EB-0C51FB85BFE6}" type="datetimeFigureOut">
               <a:rPr lang="en-US" smtClean="0"/>
-              <a:t>12/12/22</a:t>
+              <a:t>1/9/23</a:t>
             </a:fld>
             <a:endParaRPr lang="en-US"/>
           </a:p>
@@ -1272,7 +1272,7 @@
           <a:p>
             <a:fld id="{7212EF1E-2CB8-C54B-94EB-0C51FB85BFE6}" type="datetimeFigureOut">
               <a:rPr lang="en-US" smtClean="0"/>
-              <a:t>12/12/22</a:t>
+              <a:t>1/9/23</a:t>
             </a:fld>
             <a:endParaRPr lang="en-US"/>
           </a:p>
@@ -1517,7 +1517,7 @@
           <a:p>
             <a:fld id="{7212EF1E-2CB8-C54B-94EB-0C51FB85BFE6}" type="datetimeFigureOut">
               <a:rPr lang="en-US" smtClean="0"/>
-              <a:t>12/12/22</a:t>
+              <a:t>1/9/23</a:t>
             </a:fld>
             <a:endParaRPr lang="en-US"/>
           </a:p>
@@ -1802,7 +1802,7 @@
           <a:p>
             <a:fld id="{7212EF1E-2CB8-C54B-94EB-0C51FB85BFE6}" type="datetimeFigureOut">
               <a:rPr lang="en-US" smtClean="0"/>
-              <a:t>12/12/22</a:t>
+              <a:t>1/9/23</a:t>
             </a:fld>
             <a:endParaRPr lang="en-US"/>
           </a:p>
@@ -2221,7 +2221,7 @@
           <a:p>
             <a:fld id="{7212EF1E-2CB8-C54B-94EB-0C51FB85BFE6}" type="datetimeFigureOut">
               <a:rPr lang="en-US" smtClean="0"/>
-              <a:t>12/12/22</a:t>
+              <a:t>1/9/23</a:t>
             </a:fld>
             <a:endParaRPr lang="en-US"/>
           </a:p>
@@ -2338,7 +2338,7 @@
           <a:p>
             <a:fld id="{7212EF1E-2CB8-C54B-94EB-0C51FB85BFE6}" type="datetimeFigureOut">
               <a:rPr lang="en-US" smtClean="0"/>
-              <a:t>12/12/22</a:t>
+              <a:t>1/9/23</a:t>
             </a:fld>
             <a:endParaRPr lang="en-US"/>
           </a:p>
@@ -2433,7 +2433,7 @@
           <a:p>
             <a:fld id="{7212EF1E-2CB8-C54B-94EB-0C51FB85BFE6}" type="datetimeFigureOut">
               <a:rPr lang="en-US" smtClean="0"/>
-              <a:t>12/12/22</a:t>
+              <a:t>1/9/23</a:t>
             </a:fld>
             <a:endParaRPr lang="en-US"/>
           </a:p>
@@ -2708,7 +2708,7 @@
           <a:p>
             <a:fld id="{7212EF1E-2CB8-C54B-94EB-0C51FB85BFE6}" type="datetimeFigureOut">
               <a:rPr lang="en-US" smtClean="0"/>
-              <a:t>12/12/22</a:t>
+              <a:t>1/9/23</a:t>
             </a:fld>
             <a:endParaRPr lang="en-US"/>
           </a:p>
@@ -2960,7 +2960,7 @@
           <a:p>
             <a:fld id="{7212EF1E-2CB8-C54B-94EB-0C51FB85BFE6}" type="datetimeFigureOut">
               <a:rPr lang="en-US" smtClean="0"/>
-              <a:t>12/12/22</a:t>
+              <a:t>1/9/23</a:t>
             </a:fld>
             <a:endParaRPr lang="en-US"/>
           </a:p>
@@ -3171,7 +3171,7 @@
           <a:p>
             <a:fld id="{7212EF1E-2CB8-C54B-94EB-0C51FB85BFE6}" type="datetimeFigureOut">
               <a:rPr lang="en-US" smtClean="0"/>
-              <a:t>12/12/22</a:t>
+              <a:t>1/9/23</a:t>
             </a:fld>
             <a:endParaRPr lang="en-US"/>
           </a:p>
@@ -4876,21 +4876,7 @@
                 <a:latin typeface="Times New Roman" panose="02020603050405020304" pitchFamily="18" charset="0"/>
                 <a:cs typeface="Times New Roman" panose="02020603050405020304" pitchFamily="18" charset="0"/>
               </a:rPr>
-              <a:t> game. We have included 4 blocks, and each block includes 52 </a:t>
-            </a:r>
-            <a:r>
-              <a:rPr lang="en-US">
-                <a:latin typeface="Times New Roman" panose="02020603050405020304" pitchFamily="18" charset="0"/>
-                <a:cs typeface="Times New Roman" panose="02020603050405020304" pitchFamily="18" charset="0"/>
-              </a:rPr>
-              <a:t>games (5 </a:t>
-            </a:r>
-            <a:r>
-              <a:rPr lang="en-US" dirty="0">
-                <a:latin typeface="Times New Roman" panose="02020603050405020304" pitchFamily="18" charset="0"/>
-                <a:cs typeface="Times New Roman" panose="02020603050405020304" pitchFamily="18" charset="0"/>
-              </a:rPr>
-              <a:t>minutes per block). After finishing each block, you can take a short break if needed.</a:t>
+              <a:t> game. We have included 4 blocks, and each block includes 52 games (5 minutes per block). After finishing each block, you can take a short break if needed.</a:t>
             </a:r>
           </a:p>
           <a:p>
@@ -4907,14 +4893,28 @@
                 <a:latin typeface="Times New Roman" panose="02020603050405020304" pitchFamily="18" charset="0"/>
                 <a:cs typeface="Times New Roman" panose="02020603050405020304" pitchFamily="18" charset="0"/>
               </a:rPr>
-              <a:t>At the end of the experiment, we will randomly pick 4 guessing games and 4 choice games. The money that you have win or lost on these 8 games will be added up and paid to you as an extra bonus (maximum 1 British pound). If you end up with 0 and a negative number, then you won’t get an extra bonus. Since you don’t know which four games will be picked, your best strategy is to </a:t>
+              <a:t>At the end of the experiment, we will </a:t>
             </a:r>
             <a:r>
               <a:rPr lang="en-US" b="1" dirty="0">
                 <a:latin typeface="Times New Roman" panose="02020603050405020304" pitchFamily="18" charset="0"/>
                 <a:cs typeface="Times New Roman" panose="02020603050405020304" pitchFamily="18" charset="0"/>
               </a:rPr>
-              <a:t>treat each game as if it is the only one that counts.</a:t>
+              <a:t>randomly pick 4 guessing games and 4 choice games</a:t>
+            </a:r>
+            <a:r>
+              <a:rPr lang="en-US" dirty="0">
+                <a:latin typeface="Times New Roman" panose="02020603050405020304" pitchFamily="18" charset="0"/>
+                <a:cs typeface="Times New Roman" panose="02020603050405020304" pitchFamily="18" charset="0"/>
+              </a:rPr>
+              <a:t>. The money that you have win or lost on these 8 games will be added up and paid to you as an extra bonus (maximum 1 British pound). If you end up with 0 or a negative number, then you won’t get an extra bonus. Since you don’t know which games will be picked, </a:t>
+            </a:r>
+            <a:r>
+              <a:rPr lang="en-US" b="1" dirty="0">
+                <a:latin typeface="Times New Roman" panose="02020603050405020304" pitchFamily="18" charset="0"/>
+                <a:cs typeface="Times New Roman" panose="02020603050405020304" pitchFamily="18" charset="0"/>
+              </a:rPr>
+              <a:t>your best strategy is to treat each game as if it is the only one that counts.</a:t>
             </a:r>
           </a:p>
           <a:p>

</xml_diff>